<commit_message>
Documemented the metamodel of the TOSCA Implementation Landscape
</commit_message>
<xml_diff>
--- a/Generation Process.pptx
+++ b/Generation Process.pptx
@@ -2780,84 +2780,12 @@
           <a:chExt cx="0" cy="0"/>
         </a:xfrm>
       </p:grpSpPr>
-      <p:sp>
-        <p:nvSpPr>
-          <p:cNvPr id="31" name="ZoneTexte 30">
+      <p:grpSp>
+        <p:nvGrpSpPr>
+          <p:cNvPr id="67" name="Groupe 66">
             <a:extLst>
               <a:ext uri="{FF2B5EF4-FFF2-40B4-BE49-F238E27FC236}">
-                <a16:creationId xmlns:a16="http://schemas.microsoft.com/office/drawing/2014/main" id="{89FC2592-4650-6C47-9D1C-93DF44B7361B}"/>
-              </a:ext>
-            </a:extLst>
-          </p:cNvPr>
-          <p:cNvSpPr txBox="1"/>
-          <p:nvPr/>
-        </p:nvSpPr>
-        <p:spPr>
-          <a:xfrm>
-            <a:off x="2422780" y="4468947"/>
-            <a:ext cx="4400564" cy="707886"/>
-          </a:xfrm>
-          <a:prstGeom prst="rect">
-            <a:avLst/>
-          </a:prstGeom>
-          <a:noFill/>
-        </p:spPr>
-        <p:txBody>
-          <a:bodyPr wrap="none" rtlCol="0">
-            <a:spAutoFit/>
-          </a:bodyPr>
-          <a:lstStyle/>
-          <a:p>
-            <a:r>
-              <a:rPr lang="fr-FR" sz="4000" b="1" dirty="0" err="1">
-                <a:solidFill>
-                  <a:schemeClr val="accent1"/>
-                </a:solidFill>
-                <a:latin typeface="Bradley Hand" pitchFamily="2" charset="77"/>
-                <a:ea typeface="Brush Script MT" panose="03060802040406070304" pitchFamily="66" charset="-122"/>
-                <a:cs typeface="Brush Script MT" panose="03060802040406070304" pitchFamily="66" charset="-122"/>
-              </a:rPr>
-              <a:t>Generation</a:t>
-            </a:r>
-            <a:r>
-              <a:rPr lang="fr-FR" sz="4000" b="1" dirty="0">
-                <a:solidFill>
-                  <a:schemeClr val="accent1"/>
-                </a:solidFill>
-                <a:latin typeface="Bradley Hand" pitchFamily="2" charset="77"/>
-                <a:ea typeface="Brush Script MT" panose="03060802040406070304" pitchFamily="66" charset="-122"/>
-                <a:cs typeface="Brush Script MT" panose="03060802040406070304" pitchFamily="66" charset="-122"/>
-              </a:rPr>
-              <a:t> </a:t>
-            </a:r>
-            <a:r>
-              <a:rPr lang="fr-FR" sz="4000" b="1" dirty="0" err="1">
-                <a:solidFill>
-                  <a:schemeClr val="accent1"/>
-                </a:solidFill>
-                <a:latin typeface="Bradley Hand" pitchFamily="2" charset="77"/>
-                <a:ea typeface="Brush Script MT" panose="03060802040406070304" pitchFamily="66" charset="-122"/>
-                <a:cs typeface="Brush Script MT" panose="03060802040406070304" pitchFamily="66" charset="-122"/>
-              </a:rPr>
-              <a:t>Process</a:t>
-            </a:r>
-            <a:endParaRPr lang="fr-FR" sz="4000" b="1" dirty="0">
-              <a:solidFill>
-                <a:schemeClr val="accent1"/>
-              </a:solidFill>
-              <a:latin typeface="Bradley Hand" pitchFamily="2" charset="77"/>
-              <a:ea typeface="Brush Script MT" panose="03060802040406070304" pitchFamily="66" charset="-122"/>
-              <a:cs typeface="Brush Script MT" panose="03060802040406070304" pitchFamily="66" charset="-122"/>
-            </a:endParaRPr>
-          </a:p>
-        </p:txBody>
-      </p:sp>
-      <p:grpSp>
-        <p:nvGrpSpPr>
-          <p:cNvPr id="43" name="Groupe 42">
-            <a:extLst>
-              <a:ext uri="{FF2B5EF4-FFF2-40B4-BE49-F238E27FC236}">
-                <a16:creationId xmlns:a16="http://schemas.microsoft.com/office/drawing/2014/main" id="{A28FD594-16F3-D441-B014-5A58041F0EB7}"/>
+                <a16:creationId xmlns:a16="http://schemas.microsoft.com/office/drawing/2014/main" id="{25A3B784-E544-0249-9A3B-2E0D5038C0C5}"/>
               </a:ext>
             </a:extLst>
           </p:cNvPr>
@@ -2866,12 +2794,84 @@
         </p:nvGrpSpPr>
         <p:grpSpPr>
           <a:xfrm>
-            <a:off x="932179" y="1407348"/>
-            <a:ext cx="7381766" cy="2949794"/>
-            <a:chOff x="1019664" y="1934071"/>
-            <a:chExt cx="7381766" cy="2949794"/>
+            <a:off x="521381" y="387449"/>
+            <a:ext cx="8710557" cy="5851526"/>
+            <a:chOff x="521381" y="151474"/>
+            <a:chExt cx="8710557" cy="5851526"/>
           </a:xfrm>
         </p:grpSpPr>
+        <p:sp>
+          <p:nvSpPr>
+            <p:cNvPr id="31" name="ZoneTexte 30">
+              <a:extLst>
+                <a:ext uri="{FF2B5EF4-FFF2-40B4-BE49-F238E27FC236}">
+                  <a16:creationId xmlns:a16="http://schemas.microsoft.com/office/drawing/2014/main" id="{89FC2592-4650-6C47-9D1C-93DF44B7361B}"/>
+                </a:ext>
+              </a:extLst>
+            </p:cNvPr>
+            <p:cNvSpPr txBox="1"/>
+            <p:nvPr/>
+          </p:nvSpPr>
+          <p:spPr>
+            <a:xfrm>
+              <a:off x="2752718" y="151474"/>
+              <a:ext cx="4400564" cy="707886"/>
+            </a:xfrm>
+            <a:prstGeom prst="rect">
+              <a:avLst/>
+            </a:prstGeom>
+            <a:noFill/>
+          </p:spPr>
+          <p:txBody>
+            <a:bodyPr wrap="none" rtlCol="0">
+              <a:spAutoFit/>
+            </a:bodyPr>
+            <a:lstStyle/>
+            <a:p>
+              <a:r>
+                <a:rPr lang="fr-FR" sz="4000" b="1" dirty="0" err="1">
+                  <a:solidFill>
+                    <a:schemeClr val="accent1"/>
+                  </a:solidFill>
+                  <a:latin typeface="Bradley Hand" pitchFamily="2" charset="77"/>
+                  <a:ea typeface="Brush Script MT" panose="03060802040406070304" pitchFamily="66" charset="-122"/>
+                  <a:cs typeface="Brush Script MT" panose="03060802040406070304" pitchFamily="66" charset="-122"/>
+                </a:rPr>
+                <a:t>Generation</a:t>
+              </a:r>
+              <a:r>
+                <a:rPr lang="fr-FR" sz="4000" b="1" dirty="0">
+                  <a:solidFill>
+                    <a:schemeClr val="accent1"/>
+                  </a:solidFill>
+                  <a:latin typeface="Bradley Hand" pitchFamily="2" charset="77"/>
+                  <a:ea typeface="Brush Script MT" panose="03060802040406070304" pitchFamily="66" charset="-122"/>
+                  <a:cs typeface="Brush Script MT" panose="03060802040406070304" pitchFamily="66" charset="-122"/>
+                </a:rPr>
+                <a:t> </a:t>
+              </a:r>
+              <a:r>
+                <a:rPr lang="fr-FR" sz="4000" b="1" dirty="0" err="1">
+                  <a:solidFill>
+                    <a:schemeClr val="accent1"/>
+                  </a:solidFill>
+                  <a:latin typeface="Bradley Hand" pitchFamily="2" charset="77"/>
+                  <a:ea typeface="Brush Script MT" panose="03060802040406070304" pitchFamily="66" charset="-122"/>
+                  <a:cs typeface="Brush Script MT" panose="03060802040406070304" pitchFamily="66" charset="-122"/>
+                </a:rPr>
+                <a:t>Process</a:t>
+              </a:r>
+              <a:endParaRPr lang="fr-FR" sz="4000" b="1" dirty="0">
+                <a:solidFill>
+                  <a:schemeClr val="accent1"/>
+                </a:solidFill>
+                <a:latin typeface="Bradley Hand" pitchFamily="2" charset="77"/>
+                <a:ea typeface="Brush Script MT" panose="03060802040406070304" pitchFamily="66" charset="-122"/>
+                <a:cs typeface="Brush Script MT" panose="03060802040406070304" pitchFamily="66" charset="-122"/>
+              </a:endParaRPr>
+            </a:p>
+          </p:txBody>
+        </p:sp>
         <p:sp>
           <p:nvSpPr>
             <p:cNvPr id="32" name="Document 31">
@@ -2886,7 +2886,7 @@
           </p:nvSpPr>
           <p:spPr>
             <a:xfrm>
-              <a:off x="4229629" y="2974241"/>
+              <a:off x="3884028" y="4960923"/>
               <a:ext cx="1267767" cy="1038519"/>
             </a:xfrm>
             <a:prstGeom prst="flowChartDocument">
@@ -2982,10 +2982,10 @@
           </p:nvGrpSpPr>
           <p:grpSpPr>
             <a:xfrm>
-              <a:off x="7133663" y="1934071"/>
-              <a:ext cx="1267767" cy="2949794"/>
-              <a:chOff x="6577481" y="1934071"/>
-              <a:chExt cx="1267767" cy="2949794"/>
+              <a:off x="7964171" y="1733848"/>
+              <a:ext cx="1267767" cy="3663659"/>
+              <a:chOff x="6577481" y="1220206"/>
+              <a:chExt cx="1267767" cy="3663659"/>
             </a:xfrm>
           </p:grpSpPr>
           <p:sp>
@@ -3002,7 +3002,7 @@
             </p:nvSpPr>
             <p:spPr>
               <a:xfrm>
-                <a:off x="6577481" y="1934071"/>
+                <a:off x="6577481" y="1220206"/>
                 <a:ext cx="1267767" cy="1038519"/>
               </a:xfrm>
               <a:prstGeom prst="flowChartDocument">
@@ -3185,7 +3185,7 @@
           </p:nvSpPr>
           <p:spPr>
             <a:xfrm>
-              <a:off x="1019664" y="2974241"/>
+              <a:off x="639948" y="4964481"/>
               <a:ext cx="1267767" cy="1038519"/>
             </a:xfrm>
             <a:prstGeom prst="flowChartDocument">
@@ -3281,7 +3281,7 @@
           </p:nvGrpSpPr>
           <p:grpSpPr>
             <a:xfrm>
-              <a:off x="2634224" y="2592242"/>
+              <a:off x="2254508" y="4582482"/>
               <a:ext cx="1248612" cy="1177563"/>
               <a:chOff x="5489018" y="3586852"/>
               <a:chExt cx="1248612" cy="1177563"/>
@@ -3375,7 +3375,7 @@
           </p:nvCxnSpPr>
           <p:spPr>
             <a:xfrm>
-              <a:off x="2287431" y="3493501"/>
+              <a:off x="1907715" y="5483741"/>
               <a:ext cx="1954630" cy="0"/>
             </a:xfrm>
             <a:prstGeom prst="straightConnector1">
@@ -3414,7 +3414,7 @@
           </p:nvGrpSpPr>
           <p:grpSpPr>
             <a:xfrm>
-              <a:off x="5844189" y="2592242"/>
+              <a:off x="6086643" y="2882626"/>
               <a:ext cx="942680" cy="1177563"/>
               <a:chOff x="5558303" y="3586852"/>
               <a:chExt cx="942680" cy="1177563"/>
@@ -3493,27 +3493,213 @@
             </p:txBody>
           </p:sp>
         </p:grpSp>
+        <p:sp>
+          <p:nvSpPr>
+            <p:cNvPr id="18" name="Document 17">
+              <a:extLst>
+                <a:ext uri="{FF2B5EF4-FFF2-40B4-BE49-F238E27FC236}">
+                  <a16:creationId xmlns:a16="http://schemas.microsoft.com/office/drawing/2014/main" id="{A448E5BF-A42F-9642-94EE-C4725C1B935C}"/>
+                </a:ext>
+              </a:extLst>
+            </p:cNvPr>
+            <p:cNvSpPr/>
+            <p:nvPr/>
+          </p:nvSpPr>
+          <p:spPr>
+            <a:xfrm>
+              <a:off x="605741" y="1706346"/>
+              <a:ext cx="1301974" cy="1038519"/>
+            </a:xfrm>
+            <a:prstGeom prst="flowChartDocument">
+              <a:avLst/>
+            </a:prstGeom>
+            <a:noFill/>
+            <a:ln>
+              <a:solidFill>
+                <a:schemeClr val="tx1"/>
+              </a:solidFill>
+            </a:ln>
+          </p:spPr>
+          <p:style>
+            <a:lnRef idx="2">
+              <a:schemeClr val="accent1">
+                <a:shade val="50000"/>
+              </a:schemeClr>
+            </a:lnRef>
+            <a:fillRef idx="1">
+              <a:schemeClr val="accent1"/>
+            </a:fillRef>
+            <a:effectRef idx="0">
+              <a:schemeClr val="accent1"/>
+            </a:effectRef>
+            <a:fontRef idx="minor">
+              <a:schemeClr val="lt1"/>
+            </a:fontRef>
+          </p:style>
+          <p:txBody>
+            <a:bodyPr rtlCol="0" anchor="ctr"/>
+            <a:lstStyle/>
+            <a:p>
+              <a:pPr algn="ctr"/>
+              <a:r>
+                <a:rPr lang="fr-FR" sz="1801" b="1" dirty="0" err="1">
+                  <a:solidFill>
+                    <a:schemeClr val="accent1"/>
+                  </a:solidFill>
+                </a:rPr>
+                <a:t>Metamodel</a:t>
+              </a:r>
+              <a:endParaRPr lang="fr-FR" sz="1801" b="1" dirty="0">
+                <a:solidFill>
+                  <a:schemeClr val="accent1"/>
+                </a:solidFill>
+              </a:endParaRPr>
+            </a:p>
+            <a:p>
+              <a:pPr algn="ctr"/>
+              <a:endParaRPr lang="fr-FR" sz="1401" i="1" dirty="0">
+                <a:solidFill>
+                  <a:schemeClr val="tx1"/>
+                </a:solidFill>
+              </a:endParaRPr>
+            </a:p>
+            <a:p>
+              <a:pPr algn="ctr"/>
+              <a:r>
+                <a:rPr lang="fr-FR" sz="1401" i="1" dirty="0">
+                  <a:solidFill>
+                    <a:schemeClr val="tx1"/>
+                  </a:solidFill>
+                </a:rPr>
+                <a:t>.</a:t>
+              </a:r>
+              <a:r>
+                <a:rPr lang="fr-FR" sz="1401" i="1" dirty="0" err="1">
+                  <a:solidFill>
+                    <a:schemeClr val="tx1"/>
+                  </a:solidFill>
+                </a:rPr>
+                <a:t>puml</a:t>
+              </a:r>
+              <a:endParaRPr lang="fr-FR" sz="1401" i="1" dirty="0">
+                <a:solidFill>
+                  <a:schemeClr val="tx1"/>
+                </a:solidFill>
+              </a:endParaRPr>
+            </a:p>
+          </p:txBody>
+        </p:sp>
         <p:cxnSp>
           <p:nvCxnSpPr>
-            <p:cNvPr id="26" name="Connecteur en angle 25">
+            <p:cNvPr id="11" name="Connecteur en angle 10">
               <a:extLst>
                 <a:ext uri="{FF2B5EF4-FFF2-40B4-BE49-F238E27FC236}">
-                  <a16:creationId xmlns:a16="http://schemas.microsoft.com/office/drawing/2014/main" id="{3B463189-4522-6746-A171-0043474ECE74}"/>
+                  <a16:creationId xmlns:a16="http://schemas.microsoft.com/office/drawing/2014/main" id="{8A11A1A3-6625-D042-9FB6-C0C7FF4ED7E9}"/>
                 </a:ext>
               </a:extLst>
             </p:cNvPr>
             <p:cNvCxnSpPr>
+              <a:cxnSpLocks/>
               <a:stCxn id="32" idx="3"/>
-              <a:endCxn id="33" idx="2"/>
+              <a:endCxn id="38" idx="1"/>
             </p:cNvCxnSpPr>
             <p:nvPr/>
           </p:nvCxnSpPr>
           <p:spPr>
             <a:xfrm flipV="1">
-              <a:off x="5497396" y="2903932"/>
-              <a:ext cx="2270151" cy="589569"/>
+              <a:off x="5151795" y="3353966"/>
+              <a:ext cx="934848" cy="2126217"/>
             </a:xfrm>
-            <a:prstGeom prst="bentConnector2">
+            <a:prstGeom prst="bentConnector3">
+              <a:avLst>
+                <a:gd name="adj1" fmla="val 50000"/>
+              </a:avLst>
+            </a:prstGeom>
+            <a:ln>
+              <a:tailEnd type="triangle"/>
+            </a:ln>
+          </p:spPr>
+          <p:style>
+            <a:lnRef idx="1">
+              <a:schemeClr val="accent1"/>
+            </a:lnRef>
+            <a:fillRef idx="0">
+              <a:schemeClr val="accent1"/>
+            </a:fillRef>
+            <a:effectRef idx="0">
+              <a:schemeClr val="accent1"/>
+            </a:effectRef>
+            <a:fontRef idx="minor">
+              <a:schemeClr val="tx1"/>
+            </a:fontRef>
+          </p:style>
+        </p:cxnSp>
+        <p:cxnSp>
+          <p:nvCxnSpPr>
+            <p:cNvPr id="22" name="Connecteur en angle 21">
+              <a:extLst>
+                <a:ext uri="{FF2B5EF4-FFF2-40B4-BE49-F238E27FC236}">
+                  <a16:creationId xmlns:a16="http://schemas.microsoft.com/office/drawing/2014/main" id="{32E57EDA-6198-9244-B3FF-FF94302A66B0}"/>
+                </a:ext>
+              </a:extLst>
+            </p:cNvPr>
+            <p:cNvCxnSpPr>
+              <a:cxnSpLocks/>
+              <a:stCxn id="18" idx="3"/>
+              <a:endCxn id="38" idx="1"/>
+            </p:cNvCxnSpPr>
+            <p:nvPr/>
+          </p:nvCxnSpPr>
+          <p:spPr>
+            <a:xfrm>
+              <a:off x="1907715" y="2225606"/>
+              <a:ext cx="4178928" cy="1128360"/>
+            </a:xfrm>
+            <a:prstGeom prst="bentConnector3">
+              <a:avLst>
+                <a:gd name="adj1" fmla="val 89025"/>
+              </a:avLst>
+            </a:prstGeom>
+            <a:ln>
+              <a:tailEnd type="triangle"/>
+            </a:ln>
+          </p:spPr>
+          <p:style>
+            <a:lnRef idx="1">
+              <a:schemeClr val="accent1"/>
+            </a:lnRef>
+            <a:fillRef idx="0">
+              <a:schemeClr val="accent1"/>
+            </a:fillRef>
+            <a:effectRef idx="0">
+              <a:schemeClr val="accent1"/>
+            </a:effectRef>
+            <a:fontRef idx="minor">
+              <a:schemeClr val="tx1"/>
+            </a:fontRef>
+          </p:style>
+        </p:cxnSp>
+        <p:cxnSp>
+          <p:nvCxnSpPr>
+            <p:cNvPr id="27" name="Connecteur en angle 26">
+              <a:extLst>
+                <a:ext uri="{FF2B5EF4-FFF2-40B4-BE49-F238E27FC236}">
+                  <a16:creationId xmlns:a16="http://schemas.microsoft.com/office/drawing/2014/main" id="{6FD762A9-01AB-B34D-8479-AFB74F370DAA}"/>
+                </a:ext>
+              </a:extLst>
+            </p:cNvPr>
+            <p:cNvCxnSpPr>
+              <a:stCxn id="38" idx="3"/>
+              <a:endCxn id="33" idx="1"/>
+            </p:cNvCxnSpPr>
+            <p:nvPr/>
+          </p:nvCxnSpPr>
+          <p:spPr>
+            <a:xfrm flipV="1">
+              <a:off x="7029323" y="2253108"/>
+              <a:ext cx="934848" cy="1100858"/>
+            </a:xfrm>
+            <a:prstGeom prst="bentConnector3">
               <a:avLst/>
             </a:prstGeom>
             <a:ln>
@@ -3537,25 +3723,25 @@
         </p:cxnSp>
         <p:cxnSp>
           <p:nvCxnSpPr>
-            <p:cNvPr id="41" name="Connecteur en angle 40">
+            <p:cNvPr id="29" name="Connecteur en angle 28">
               <a:extLst>
                 <a:ext uri="{FF2B5EF4-FFF2-40B4-BE49-F238E27FC236}">
-                  <a16:creationId xmlns:a16="http://schemas.microsoft.com/office/drawing/2014/main" id="{EA61BFC8-E3C6-6C40-B3BB-C173A770DDC7}"/>
+                  <a16:creationId xmlns:a16="http://schemas.microsoft.com/office/drawing/2014/main" id="{5DDFFE31-CC7F-E540-BB61-CD882F7EA4B9}"/>
                 </a:ext>
               </a:extLst>
             </p:cNvPr>
             <p:cNvCxnSpPr>
-              <a:stCxn id="32" idx="3"/>
-              <a:endCxn id="35" idx="0"/>
+              <a:stCxn id="38" idx="3"/>
+              <a:endCxn id="35" idx="1"/>
             </p:cNvCxnSpPr>
             <p:nvPr/>
           </p:nvCxnSpPr>
           <p:spPr>
             <a:xfrm>
-              <a:off x="5497396" y="3493501"/>
-              <a:ext cx="2270151" cy="351845"/>
+              <a:off x="7029323" y="3353966"/>
+              <a:ext cx="934848" cy="1524282"/>
             </a:xfrm>
-            <a:prstGeom prst="bentConnector2">
+            <a:prstGeom prst="bentConnector3">
               <a:avLst/>
             </a:prstGeom>
             <a:ln>
@@ -3577,6 +3763,92 @@
             </a:fontRef>
           </p:style>
         </p:cxnSp>
+        <p:cxnSp>
+          <p:nvCxnSpPr>
+            <p:cNvPr id="44" name="Connecteur droit avec flèche 43">
+              <a:extLst>
+                <a:ext uri="{FF2B5EF4-FFF2-40B4-BE49-F238E27FC236}">
+                  <a16:creationId xmlns:a16="http://schemas.microsoft.com/office/drawing/2014/main" id="{C51AF5BB-845E-1B48-AAA5-E6CDB6CFD924}"/>
+                </a:ext>
+              </a:extLst>
+            </p:cNvPr>
+            <p:cNvCxnSpPr>
+              <a:stCxn id="36" idx="0"/>
+              <a:endCxn id="18" idx="2"/>
+            </p:cNvCxnSpPr>
+            <p:nvPr/>
+          </p:nvCxnSpPr>
+          <p:spPr>
+            <a:xfrm flipH="1" flipV="1">
+              <a:off x="1256728" y="2676207"/>
+              <a:ext cx="17104" cy="2288274"/>
+            </a:xfrm>
+            <a:prstGeom prst="straightConnector1">
+              <a:avLst/>
+            </a:prstGeom>
+            <a:ln>
+              <a:prstDash val="dash"/>
+              <a:tailEnd type="triangle"/>
+            </a:ln>
+          </p:spPr>
+          <p:style>
+            <a:lnRef idx="1">
+              <a:schemeClr val="accent1"/>
+            </a:lnRef>
+            <a:fillRef idx="0">
+              <a:schemeClr val="accent1"/>
+            </a:fillRef>
+            <a:effectRef idx="0">
+              <a:schemeClr val="accent1"/>
+            </a:effectRef>
+            <a:fontRef idx="minor">
+              <a:schemeClr val="tx1"/>
+            </a:fontRef>
+          </p:style>
+        </p:cxnSp>
+        <p:sp>
+          <p:nvSpPr>
+            <p:cNvPr id="45" name="ZoneTexte 44">
+              <a:extLst>
+                <a:ext uri="{FF2B5EF4-FFF2-40B4-BE49-F238E27FC236}">
+                  <a16:creationId xmlns:a16="http://schemas.microsoft.com/office/drawing/2014/main" id="{F452B010-A06D-D84C-A98E-4497A122B13F}"/>
+                </a:ext>
+              </a:extLst>
+            </p:cNvPr>
+            <p:cNvSpPr txBox="1"/>
+            <p:nvPr/>
+          </p:nvSpPr>
+          <p:spPr>
+            <a:xfrm>
+              <a:off x="521381" y="3700785"/>
+              <a:ext cx="1442896" cy="307777"/>
+            </a:xfrm>
+            <a:prstGeom prst="rect">
+              <a:avLst/>
+            </a:prstGeom>
+            <a:noFill/>
+          </p:spPr>
+          <p:txBody>
+            <a:bodyPr wrap="none" rtlCol="0">
+              <a:spAutoFit/>
+            </a:bodyPr>
+            <a:lstStyle/>
+            <a:p>
+              <a:r>
+                <a:rPr lang="fr-FR" sz="1400" dirty="0"/>
+                <a:t>&lt;&lt;</a:t>
+              </a:r>
+              <a:r>
+                <a:rPr lang="fr-FR" sz="1400" dirty="0" err="1"/>
+                <a:t>Conforms</a:t>
+              </a:r>
+              <a:r>
+                <a:rPr lang="fr-FR" sz="1400" dirty="0"/>
+                <a:t> to&gt;&gt;</a:t>
+              </a:r>
+            </a:p>
+          </p:txBody>
+        </p:sp>
       </p:grpSp>
     </p:spTree>
     <p:extLst>

</xml_diff>